<commit_message>
update scheme, add images
</commit_message>
<xml_diff>
--- a/docs/project.pptx
+++ b/docs/project.pptx
@@ -6,19 +6,23 @@
   </p:sldMasterIdLst>
   <p:sldIdLst>
     <p:sldId id="256" r:id="rId2"/>
-    <p:sldId id="257" r:id="rId3"/>
+    <p:sldId id="270" r:id="rId3"/>
     <p:sldId id="258" r:id="rId4"/>
-    <p:sldId id="259" r:id="rId5"/>
-    <p:sldId id="260" r:id="rId6"/>
-    <p:sldId id="261" r:id="rId7"/>
-    <p:sldId id="262" r:id="rId8"/>
-    <p:sldId id="263" r:id="rId9"/>
-    <p:sldId id="264" r:id="rId10"/>
-    <p:sldId id="265" r:id="rId11"/>
-    <p:sldId id="266" r:id="rId12"/>
-    <p:sldId id="267" r:id="rId13"/>
-    <p:sldId id="268" r:id="rId14"/>
-    <p:sldId id="269" r:id="rId15"/>
+    <p:sldId id="274" r:id="rId5"/>
+    <p:sldId id="271" r:id="rId6"/>
+    <p:sldId id="260" r:id="rId7"/>
+    <p:sldId id="261" r:id="rId8"/>
+    <p:sldId id="262" r:id="rId9"/>
+    <p:sldId id="263" r:id="rId10"/>
+    <p:sldId id="264" r:id="rId11"/>
+    <p:sldId id="276" r:id="rId12"/>
+    <p:sldId id="266" r:id="rId13"/>
+    <p:sldId id="273" r:id="rId14"/>
+    <p:sldId id="272" r:id="rId15"/>
+    <p:sldId id="275" r:id="rId16"/>
+    <p:sldId id="267" r:id="rId17"/>
+    <p:sldId id="268" r:id="rId18"/>
+    <p:sldId id="269" r:id="rId19"/>
   </p:sldIdLst>
   <p:sldSz cx="12192000" cy="6858000"/>
   <p:notesSz cx="6858000" cy="9144000"/>
@@ -117,6 +121,11 @@
       </a:defRPr>
     </a:lvl9pPr>
   </p:defaultTextStyle>
+  <p:extLst>
+    <p:ext uri="{EFAFB233-063F-42B5-8137-9DF3F51BA10A}">
+      <p15:sldGuideLst xmlns:p15="http://schemas.microsoft.com/office/powerpoint/2012/main"/>
+    </p:ext>
+  </p:extLst>
 </p:presentation>
 </file>
 
@@ -267,7 +276,7 @@
           <a:p>
             <a:fld id="{0A9A872F-D9CB-4186-9C25-671FAF4AFD83}" type="datetimeFigureOut">
               <a:rPr lang="ru-RU" smtClean="0"/>
-              <a:t>10.05.2022</a:t>
+              <a:t>15.05.2022</a:t>
             </a:fld>
             <a:endParaRPr lang="ru-RU"/>
           </a:p>
@@ -465,7 +474,7 @@
           <a:p>
             <a:fld id="{0A9A872F-D9CB-4186-9C25-671FAF4AFD83}" type="datetimeFigureOut">
               <a:rPr lang="ru-RU" smtClean="0"/>
-              <a:t>10.05.2022</a:t>
+              <a:t>15.05.2022</a:t>
             </a:fld>
             <a:endParaRPr lang="ru-RU"/>
           </a:p>
@@ -673,7 +682,7 @@
           <a:p>
             <a:fld id="{0A9A872F-D9CB-4186-9C25-671FAF4AFD83}" type="datetimeFigureOut">
               <a:rPr lang="ru-RU" smtClean="0"/>
-              <a:t>10.05.2022</a:t>
+              <a:t>15.05.2022</a:t>
             </a:fld>
             <a:endParaRPr lang="ru-RU"/>
           </a:p>
@@ -871,7 +880,7 @@
           <a:p>
             <a:fld id="{0A9A872F-D9CB-4186-9C25-671FAF4AFD83}" type="datetimeFigureOut">
               <a:rPr lang="ru-RU" smtClean="0"/>
-              <a:t>10.05.2022</a:t>
+              <a:t>15.05.2022</a:t>
             </a:fld>
             <a:endParaRPr lang="ru-RU"/>
           </a:p>
@@ -1146,7 +1155,7 @@
           <a:p>
             <a:fld id="{0A9A872F-D9CB-4186-9C25-671FAF4AFD83}" type="datetimeFigureOut">
               <a:rPr lang="ru-RU" smtClean="0"/>
-              <a:t>10.05.2022</a:t>
+              <a:t>15.05.2022</a:t>
             </a:fld>
             <a:endParaRPr lang="ru-RU"/>
           </a:p>
@@ -1411,7 +1420,7 @@
           <a:p>
             <a:fld id="{0A9A872F-D9CB-4186-9C25-671FAF4AFD83}" type="datetimeFigureOut">
               <a:rPr lang="ru-RU" smtClean="0"/>
-              <a:t>10.05.2022</a:t>
+              <a:t>15.05.2022</a:t>
             </a:fld>
             <a:endParaRPr lang="ru-RU"/>
           </a:p>
@@ -1823,7 +1832,7 @@
           <a:p>
             <a:fld id="{0A9A872F-D9CB-4186-9C25-671FAF4AFD83}" type="datetimeFigureOut">
               <a:rPr lang="ru-RU" smtClean="0"/>
-              <a:t>10.05.2022</a:t>
+              <a:t>15.05.2022</a:t>
             </a:fld>
             <a:endParaRPr lang="ru-RU"/>
           </a:p>
@@ -1964,7 +1973,7 @@
           <a:p>
             <a:fld id="{0A9A872F-D9CB-4186-9C25-671FAF4AFD83}" type="datetimeFigureOut">
               <a:rPr lang="ru-RU" smtClean="0"/>
-              <a:t>10.05.2022</a:t>
+              <a:t>15.05.2022</a:t>
             </a:fld>
             <a:endParaRPr lang="ru-RU"/>
           </a:p>
@@ -2077,7 +2086,7 @@
           <a:p>
             <a:fld id="{0A9A872F-D9CB-4186-9C25-671FAF4AFD83}" type="datetimeFigureOut">
               <a:rPr lang="ru-RU" smtClean="0"/>
-              <a:t>10.05.2022</a:t>
+              <a:t>15.05.2022</a:t>
             </a:fld>
             <a:endParaRPr lang="ru-RU"/>
           </a:p>
@@ -2388,7 +2397,7 @@
           <a:p>
             <a:fld id="{0A9A872F-D9CB-4186-9C25-671FAF4AFD83}" type="datetimeFigureOut">
               <a:rPr lang="ru-RU" smtClean="0"/>
-              <a:t>10.05.2022</a:t>
+              <a:t>15.05.2022</a:t>
             </a:fld>
             <a:endParaRPr lang="ru-RU"/>
           </a:p>
@@ -2676,7 +2685,7 @@
           <a:p>
             <a:fld id="{0A9A872F-D9CB-4186-9C25-671FAF4AFD83}" type="datetimeFigureOut">
               <a:rPr lang="ru-RU" smtClean="0"/>
-              <a:t>10.05.2022</a:t>
+              <a:t>15.05.2022</a:t>
             </a:fld>
             <a:endParaRPr lang="ru-RU"/>
           </a:p>
@@ -2917,7 +2926,7 @@
           <a:p>
             <a:fld id="{0A9A872F-D9CB-4186-9C25-671FAF4AFD83}" type="datetimeFigureOut">
               <a:rPr lang="ru-RU" smtClean="0"/>
-              <a:t>10.05.2022</a:t>
+              <a:t>15.05.2022</a:t>
             </a:fld>
             <a:endParaRPr lang="ru-RU"/>
           </a:p>
@@ -3357,7 +3366,7 @@
           <a:p>
             <a:r>
               <a:rPr lang="en-US" dirty="0"/>
-              <a:t>Universal Modular Platform based on Cdm8 processor</a:t>
+              <a:t>Modular Platform based on Cdm8 processor</a:t>
             </a:r>
             <a:endParaRPr lang="ru-RU" dirty="0"/>
           </a:p>
@@ -3447,7 +3456,7 @@
           <p:cNvPr id="2" name="Заголовок 1">
             <a:extLst>
               <a:ext uri="{FF2B5EF4-FFF2-40B4-BE49-F238E27FC236}">
-                <a16:creationId xmlns:a16="http://schemas.microsoft.com/office/drawing/2014/main" id="{C5114581-AED5-4F9E-0992-B2B3D01CA422}"/>
+                <a16:creationId xmlns:a16="http://schemas.microsoft.com/office/drawing/2014/main" id="{814D474C-90BE-0440-D452-4921A1FF90A2}"/>
               </a:ext>
             </a:extLst>
           </p:cNvPr>
@@ -3464,46 +3473,52 @@
           <a:lstStyle/>
           <a:p>
             <a:r>
-              <a:rPr lang="en-US" dirty="0" err="1"/>
-              <a:t>Cocomake</a:t>
-            </a:r>
-            <a:r>
               <a:rPr lang="en-US" dirty="0"/>
-              <a:t> settings</a:t>
+              <a:t>Scheme</a:t>
             </a:r>
             <a:endParaRPr lang="ru-RU" dirty="0"/>
           </a:p>
         </p:txBody>
       </p:sp>
-      <p:sp>
-        <p:nvSpPr>
-          <p:cNvPr id="3" name="Объект 2">
-            <a:extLst>
-              <a:ext uri="{FF2B5EF4-FFF2-40B4-BE49-F238E27FC236}">
-                <a16:creationId xmlns:a16="http://schemas.microsoft.com/office/drawing/2014/main" id="{4B51FF1E-1D09-1053-2887-FC0B9B0437EC}"/>
-              </a:ext>
-            </a:extLst>
-          </p:cNvPr>
-          <p:cNvSpPr>
-            <a:spLocks noGrp="1"/>
-          </p:cNvSpPr>
+      <p:pic>
+        <p:nvPicPr>
+          <p:cNvPr id="5" name="Объект 4">
+            <a:extLst>
+              <a:ext uri="{FF2B5EF4-FFF2-40B4-BE49-F238E27FC236}">
+                <a16:creationId xmlns:a16="http://schemas.microsoft.com/office/drawing/2014/main" id="{F9CD4709-E1EA-C0DF-51D1-C10FE13F5B36}"/>
+              </a:ext>
+            </a:extLst>
+          </p:cNvPr>
+          <p:cNvPicPr>
+            <a:picLocks noGrp="1" noChangeAspect="1"/>
+          </p:cNvPicPr>
           <p:nvPr>
             <p:ph idx="1"/>
           </p:nvPr>
-        </p:nvSpPr>
-        <p:spPr/>
-        <p:txBody>
-          <a:bodyPr/>
-          <a:lstStyle/>
-          <a:p>
-            <a:endParaRPr lang="ru-RU"/>
-          </a:p>
-        </p:txBody>
-      </p:sp>
+        </p:nvPicPr>
+        <p:blipFill>
+          <a:blip r:embed="rId2">
+            <a:extLst>
+              <a:ext uri="{28A0092B-C50C-407E-A947-70E740481C1C}">
+                <a14:useLocalDpi xmlns:a14="http://schemas.microsoft.com/office/drawing/2010/main" val="0"/>
+              </a:ext>
+            </a:extLst>
+          </a:blip>
+          <a:stretch>
+            <a:fillRect/>
+          </a:stretch>
+        </p:blipFill>
+        <p:spPr>
+          <a:xfrm>
+            <a:off x="4521306" y="1836511"/>
+            <a:ext cx="4673388" cy="4351338"/>
+          </a:xfrm>
+        </p:spPr>
+      </p:pic>
     </p:spTree>
     <p:extLst>
       <p:ext uri="{BB962C8B-B14F-4D97-AF65-F5344CB8AC3E}">
-        <p14:creationId xmlns:p14="http://schemas.microsoft.com/office/powerpoint/2010/main" val="2387970381"/>
+        <p14:creationId xmlns:p14="http://schemas.microsoft.com/office/powerpoint/2010/main" val="2234971504"/>
       </p:ext>
     </p:extLst>
   </p:cSld>
@@ -3535,7 +3550,7 @@
           <p:cNvPr id="2" name="Заголовок 1">
             <a:extLst>
               <a:ext uri="{FF2B5EF4-FFF2-40B4-BE49-F238E27FC236}">
-                <a16:creationId xmlns:a16="http://schemas.microsoft.com/office/drawing/2014/main" id="{05C9C41D-AFAB-99FF-2F53-1DCD8EFB3F04}"/>
+                <a16:creationId xmlns:a16="http://schemas.microsoft.com/office/drawing/2014/main" id="{A6C966C2-D473-BFA0-F80F-AE502BB565D2}"/>
               </a:ext>
             </a:extLst>
           </p:cNvPr>
@@ -3551,43 +3566,49 @@
           <a:bodyPr/>
           <a:lstStyle/>
           <a:p>
-            <a:r>
-              <a:rPr lang="en-US" dirty="0"/>
-              <a:t>Programs structure</a:t>
-            </a:r>
-            <a:endParaRPr lang="ru-RU" dirty="0"/>
-          </a:p>
-        </p:txBody>
-      </p:sp>
-      <p:sp>
-        <p:nvSpPr>
-          <p:cNvPr id="3" name="Объект 2">
-            <a:extLst>
-              <a:ext uri="{FF2B5EF4-FFF2-40B4-BE49-F238E27FC236}">
-                <a16:creationId xmlns:a16="http://schemas.microsoft.com/office/drawing/2014/main" id="{C8091D6B-8624-8E03-1598-5E1ABCE38CAC}"/>
-              </a:ext>
-            </a:extLst>
-          </p:cNvPr>
-          <p:cNvSpPr>
-            <a:spLocks noGrp="1"/>
-          </p:cNvSpPr>
+            <a:endParaRPr lang="ru-RU"/>
+          </a:p>
+        </p:txBody>
+      </p:sp>
+      <p:pic>
+        <p:nvPicPr>
+          <p:cNvPr id="5" name="Объект 4">
+            <a:extLst>
+              <a:ext uri="{FF2B5EF4-FFF2-40B4-BE49-F238E27FC236}">
+                <a16:creationId xmlns:a16="http://schemas.microsoft.com/office/drawing/2014/main" id="{B7B5B3EA-16C5-7586-9E42-3A7923685E37}"/>
+              </a:ext>
+            </a:extLst>
+          </p:cNvPr>
+          <p:cNvPicPr>
+            <a:picLocks noGrp="1" noChangeAspect="1"/>
+          </p:cNvPicPr>
           <p:nvPr>
             <p:ph idx="1"/>
           </p:nvPr>
-        </p:nvSpPr>
-        <p:spPr/>
-        <p:txBody>
-          <a:bodyPr/>
-          <a:lstStyle/>
-          <a:p>
-            <a:endParaRPr lang="ru-RU"/>
-          </a:p>
-        </p:txBody>
-      </p:sp>
+        </p:nvPicPr>
+        <p:blipFill>
+          <a:blip r:embed="rId2">
+            <a:extLst>
+              <a:ext uri="{28A0092B-C50C-407E-A947-70E740481C1C}">
+                <a14:useLocalDpi xmlns:a14="http://schemas.microsoft.com/office/drawing/2010/main" val="0"/>
+              </a:ext>
+            </a:extLst>
+          </a:blip>
+          <a:stretch>
+            <a:fillRect/>
+          </a:stretch>
+        </p:blipFill>
+        <p:spPr>
+          <a:xfrm>
+            <a:off x="2683230" y="1825625"/>
+            <a:ext cx="6825539" cy="4351338"/>
+          </a:xfrm>
+        </p:spPr>
+      </p:pic>
     </p:spTree>
     <p:extLst>
       <p:ext uri="{BB962C8B-B14F-4D97-AF65-F5344CB8AC3E}">
-        <p14:creationId xmlns:p14="http://schemas.microsoft.com/office/powerpoint/2010/main" val="1605070855"/>
+        <p14:creationId xmlns:p14="http://schemas.microsoft.com/office/powerpoint/2010/main" val="1899531169"/>
       </p:ext>
     </p:extLst>
   </p:cSld>
@@ -3619,7 +3640,7 @@
           <p:cNvPr id="2" name="Заголовок 1">
             <a:extLst>
               <a:ext uri="{FF2B5EF4-FFF2-40B4-BE49-F238E27FC236}">
-                <a16:creationId xmlns:a16="http://schemas.microsoft.com/office/drawing/2014/main" id="{C8E8CF20-FD76-276E-C3CC-6DD5F95FB5DA}"/>
+                <a16:creationId xmlns:a16="http://schemas.microsoft.com/office/drawing/2014/main" id="{05C9C41D-AFAB-99FF-2F53-1DCD8EFB3F04}"/>
               </a:ext>
             </a:extLst>
           </p:cNvPr>
@@ -3637,7 +3658,7 @@
           <a:p>
             <a:r>
               <a:rPr lang="en-US" dirty="0"/>
-              <a:t>Code samples</a:t>
+              <a:t>Programs structure</a:t>
             </a:r>
             <a:endParaRPr lang="ru-RU" dirty="0"/>
           </a:p>
@@ -3648,7 +3669,7 @@
           <p:cNvPr id="3" name="Объект 2">
             <a:extLst>
               <a:ext uri="{FF2B5EF4-FFF2-40B4-BE49-F238E27FC236}">
-                <a16:creationId xmlns:a16="http://schemas.microsoft.com/office/drawing/2014/main" id="{10484030-C5C9-AE5D-92F1-A645820660BC}"/>
+                <a16:creationId xmlns:a16="http://schemas.microsoft.com/office/drawing/2014/main" id="{C8091D6B-8624-8E03-1598-5E1ABCE38CAC}"/>
               </a:ext>
             </a:extLst>
           </p:cNvPr>
@@ -3671,7 +3692,7 @@
     </p:spTree>
     <p:extLst>
       <p:ext uri="{BB962C8B-B14F-4D97-AF65-F5344CB8AC3E}">
-        <p14:creationId xmlns:p14="http://schemas.microsoft.com/office/powerpoint/2010/main" val="2300410717"/>
+        <p14:creationId xmlns:p14="http://schemas.microsoft.com/office/powerpoint/2010/main" val="1605070855"/>
       </p:ext>
     </p:extLst>
   </p:cSld>
@@ -3703,7 +3724,7 @@
           <p:cNvPr id="2" name="Заголовок 1">
             <a:extLst>
               <a:ext uri="{FF2B5EF4-FFF2-40B4-BE49-F238E27FC236}">
-                <a16:creationId xmlns:a16="http://schemas.microsoft.com/office/drawing/2014/main" id="{3E10851A-69BE-3873-4CB5-6B27539ECCA7}"/>
+                <a16:creationId xmlns:a16="http://schemas.microsoft.com/office/drawing/2014/main" id="{0EC127A8-3F59-69DB-749A-017BFD78A27C}"/>
               </a:ext>
             </a:extLst>
           </p:cNvPr>
@@ -3721,11 +3742,7 @@
           <a:p>
             <a:r>
               <a:rPr lang="en-US" dirty="0"/>
-              <a:t>Switch to </a:t>
-            </a:r>
-            <a:r>
-              <a:rPr lang="en-US" dirty="0" err="1"/>
-              <a:t>logisim</a:t>
+              <a:t>Battleship Game</a:t>
             </a:r>
             <a:endParaRPr lang="ru-RU" dirty="0"/>
           </a:p>
@@ -3736,7 +3753,7 @@
           <p:cNvPr id="3" name="Объект 2">
             <a:extLst>
               <a:ext uri="{FF2B5EF4-FFF2-40B4-BE49-F238E27FC236}">
-                <a16:creationId xmlns:a16="http://schemas.microsoft.com/office/drawing/2014/main" id="{39FB5322-CCEE-F2E2-5921-6A8A23A1DF57}"/>
+                <a16:creationId xmlns:a16="http://schemas.microsoft.com/office/drawing/2014/main" id="{26AFD551-0C90-3FCB-18F1-E57AEA53966A}"/>
               </a:ext>
             </a:extLst>
           </p:cNvPr>
@@ -3752,14 +3769,30 @@
           <a:bodyPr/>
           <a:lstStyle/>
           <a:p>
-            <a:endParaRPr lang="ru-RU"/>
+            <a:r>
+              <a:rPr lang="en-US" dirty="0"/>
+              <a:t>Soviet/Russian variant</a:t>
+            </a:r>
+          </a:p>
+          <a:p>
+            <a:r>
+              <a:rPr lang="en-US" dirty="0"/>
+              <a:t>Involves a lot of graphics</a:t>
+            </a:r>
+          </a:p>
+          <a:p>
+            <a:r>
+              <a:rPr lang="en-US" dirty="0"/>
+              <a:t>Uses a lot of memory</a:t>
+            </a:r>
+            <a:endParaRPr lang="ru-RU" dirty="0"/>
           </a:p>
         </p:txBody>
       </p:sp>
     </p:spTree>
     <p:extLst>
       <p:ext uri="{BB962C8B-B14F-4D97-AF65-F5344CB8AC3E}">
-        <p14:creationId xmlns:p14="http://schemas.microsoft.com/office/powerpoint/2010/main" val="722721471"/>
+        <p14:creationId xmlns:p14="http://schemas.microsoft.com/office/powerpoint/2010/main" val="2193172744"/>
       </p:ext>
     </p:extLst>
   </p:cSld>
@@ -3791,6 +3824,395 @@
           <p:cNvPr id="2" name="Заголовок 1">
             <a:extLst>
               <a:ext uri="{FF2B5EF4-FFF2-40B4-BE49-F238E27FC236}">
+                <a16:creationId xmlns:a16="http://schemas.microsoft.com/office/drawing/2014/main" id="{B5271B3B-BDEE-88EA-0A87-4066CAD722DC}"/>
+              </a:ext>
+            </a:extLst>
+          </p:cNvPr>
+          <p:cNvSpPr>
+            <a:spLocks noGrp="1"/>
+          </p:cNvSpPr>
+          <p:nvPr>
+            <p:ph type="title"/>
+          </p:nvPr>
+        </p:nvSpPr>
+        <p:spPr/>
+        <p:txBody>
+          <a:bodyPr/>
+          <a:lstStyle/>
+          <a:p>
+            <a:r>
+              <a:rPr lang="en-US" dirty="0"/>
+              <a:t>AI</a:t>
+            </a:r>
+            <a:endParaRPr lang="ru-RU" dirty="0"/>
+          </a:p>
+        </p:txBody>
+      </p:sp>
+      <p:sp>
+        <p:nvSpPr>
+          <p:cNvPr id="3" name="Объект 2">
+            <a:extLst>
+              <a:ext uri="{FF2B5EF4-FFF2-40B4-BE49-F238E27FC236}">
+                <a16:creationId xmlns:a16="http://schemas.microsoft.com/office/drawing/2014/main" id="{6E05E879-96D9-D792-0B4A-66E64DF9F89A}"/>
+              </a:ext>
+            </a:extLst>
+          </p:cNvPr>
+          <p:cNvSpPr>
+            <a:spLocks noGrp="1"/>
+          </p:cNvSpPr>
+          <p:nvPr>
+            <p:ph idx="1"/>
+          </p:nvPr>
+        </p:nvSpPr>
+        <p:spPr/>
+        <p:txBody>
+          <a:bodyPr/>
+          <a:lstStyle/>
+          <a:p>
+            <a:r>
+              <a:rPr lang="en-US" dirty="0"/>
+              <a:t>Good AI</a:t>
+            </a:r>
+          </a:p>
+          <a:p>
+            <a:r>
+              <a:rPr lang="en-US" dirty="0"/>
+              <a:t>*picture*</a:t>
+            </a:r>
+            <a:endParaRPr lang="ru-RU" dirty="0"/>
+          </a:p>
+        </p:txBody>
+      </p:sp>
+    </p:spTree>
+    <p:extLst>
+      <p:ext uri="{BB962C8B-B14F-4D97-AF65-F5344CB8AC3E}">
+        <p14:creationId xmlns:p14="http://schemas.microsoft.com/office/powerpoint/2010/main" val="3691521762"/>
+      </p:ext>
+    </p:extLst>
+  </p:cSld>
+  <p:clrMapOvr>
+    <a:masterClrMapping/>
+  </p:clrMapOvr>
+</p:sld>
+</file>
+
+<file path=ppt/slides/slide15.xml><?xml version="1.0" encoding="utf-8"?>
+<p:sld xmlns:a="http://schemas.openxmlformats.org/drawingml/2006/main" xmlns:r="http://schemas.openxmlformats.org/officeDocument/2006/relationships" xmlns:p="http://schemas.openxmlformats.org/presentationml/2006/main">
+  <p:cSld>
+    <p:spTree>
+      <p:nvGrpSpPr>
+        <p:cNvPr id="1" name=""/>
+        <p:cNvGrpSpPr/>
+        <p:nvPr/>
+      </p:nvGrpSpPr>
+      <p:grpSpPr>
+        <a:xfrm>
+          <a:off x="0" y="0"/>
+          <a:ext cx="0" cy="0"/>
+          <a:chOff x="0" y="0"/>
+          <a:chExt cx="0" cy="0"/>
+        </a:xfrm>
+      </p:grpSpPr>
+      <p:sp>
+        <p:nvSpPr>
+          <p:cNvPr id="2" name="Заголовок 1">
+            <a:extLst>
+              <a:ext uri="{FF2B5EF4-FFF2-40B4-BE49-F238E27FC236}">
+                <a16:creationId xmlns:a16="http://schemas.microsoft.com/office/drawing/2014/main" id="{E5369BBF-17FB-CFBC-9397-29EEDEBF7E5F}"/>
+              </a:ext>
+            </a:extLst>
+          </p:cNvPr>
+          <p:cNvSpPr>
+            <a:spLocks noGrp="1"/>
+          </p:cNvSpPr>
+          <p:nvPr>
+            <p:ph type="title"/>
+          </p:nvPr>
+        </p:nvSpPr>
+        <p:spPr/>
+        <p:txBody>
+          <a:bodyPr/>
+          <a:lstStyle/>
+          <a:p>
+            <a:r>
+              <a:rPr lang="en-US" dirty="0"/>
+              <a:t>C preprocessor	</a:t>
+            </a:r>
+            <a:endParaRPr lang="ru-RU" dirty="0"/>
+          </a:p>
+        </p:txBody>
+      </p:sp>
+      <p:sp>
+        <p:nvSpPr>
+          <p:cNvPr id="3" name="Объект 2">
+            <a:extLst>
+              <a:ext uri="{FF2B5EF4-FFF2-40B4-BE49-F238E27FC236}">
+                <a16:creationId xmlns:a16="http://schemas.microsoft.com/office/drawing/2014/main" id="{90016320-AF29-4AB0-C394-E3F6D530397A}"/>
+              </a:ext>
+            </a:extLst>
+          </p:cNvPr>
+          <p:cNvSpPr>
+            <a:spLocks noGrp="1"/>
+          </p:cNvSpPr>
+          <p:nvPr>
+            <p:ph idx="1"/>
+          </p:nvPr>
+        </p:nvSpPr>
+        <p:spPr/>
+        <p:txBody>
+          <a:bodyPr/>
+          <a:lstStyle/>
+          <a:p>
+            <a:r>
+              <a:rPr lang="en-US" dirty="0"/>
+              <a:t>Common constants</a:t>
+            </a:r>
+          </a:p>
+          <a:p>
+            <a:r>
+              <a:rPr lang="en-US" dirty="0"/>
+              <a:t>Libraries</a:t>
+            </a:r>
+            <a:endParaRPr lang="ru-RU" dirty="0"/>
+          </a:p>
+        </p:txBody>
+      </p:sp>
+      <p:pic>
+        <p:nvPicPr>
+          <p:cNvPr id="4" name="Рисунок 3">
+            <a:extLst>
+              <a:ext uri="{FF2B5EF4-FFF2-40B4-BE49-F238E27FC236}">
+                <a16:creationId xmlns:a16="http://schemas.microsoft.com/office/drawing/2014/main" id="{DBA3E7D1-F405-F863-25FC-0D44F2D02384}"/>
+              </a:ext>
+            </a:extLst>
+          </p:cNvPr>
+          <p:cNvPicPr>
+            <a:picLocks noChangeAspect="1"/>
+          </p:cNvPicPr>
+          <p:nvPr/>
+        </p:nvPicPr>
+        <p:blipFill rotWithShape="1">
+          <a:blip r:embed="rId2"/>
+          <a:srcRect l="9079" b="20550"/>
+          <a:stretch/>
+        </p:blipFill>
+        <p:spPr>
+          <a:xfrm>
+            <a:off x="4733925" y="2163081"/>
+            <a:ext cx="6772275" cy="3201081"/>
+          </a:xfrm>
+          <a:prstGeom prst="rect">
+            <a:avLst/>
+          </a:prstGeom>
+        </p:spPr>
+      </p:pic>
+    </p:spTree>
+    <p:extLst>
+      <p:ext uri="{BB962C8B-B14F-4D97-AF65-F5344CB8AC3E}">
+        <p14:creationId xmlns:p14="http://schemas.microsoft.com/office/powerpoint/2010/main" val="2540069007"/>
+      </p:ext>
+    </p:extLst>
+  </p:cSld>
+  <p:clrMapOvr>
+    <a:masterClrMapping/>
+  </p:clrMapOvr>
+</p:sld>
+</file>
+
+<file path=ppt/slides/slide16.xml><?xml version="1.0" encoding="utf-8"?>
+<p:sld xmlns:a="http://schemas.openxmlformats.org/drawingml/2006/main" xmlns:r="http://schemas.openxmlformats.org/officeDocument/2006/relationships" xmlns:p="http://schemas.openxmlformats.org/presentationml/2006/main">
+  <p:cSld>
+    <p:spTree>
+      <p:nvGrpSpPr>
+        <p:cNvPr id="1" name=""/>
+        <p:cNvGrpSpPr/>
+        <p:nvPr/>
+      </p:nvGrpSpPr>
+      <p:grpSpPr>
+        <a:xfrm>
+          <a:off x="0" y="0"/>
+          <a:ext cx="0" cy="0"/>
+          <a:chOff x="0" y="0"/>
+          <a:chExt cx="0" cy="0"/>
+        </a:xfrm>
+      </p:grpSpPr>
+      <p:sp>
+        <p:nvSpPr>
+          <p:cNvPr id="2" name="Заголовок 1">
+            <a:extLst>
+              <a:ext uri="{FF2B5EF4-FFF2-40B4-BE49-F238E27FC236}">
+                <a16:creationId xmlns:a16="http://schemas.microsoft.com/office/drawing/2014/main" id="{C8E8CF20-FD76-276E-C3CC-6DD5F95FB5DA}"/>
+              </a:ext>
+            </a:extLst>
+          </p:cNvPr>
+          <p:cNvSpPr>
+            <a:spLocks noGrp="1"/>
+          </p:cNvSpPr>
+          <p:nvPr>
+            <p:ph type="title"/>
+          </p:nvPr>
+        </p:nvSpPr>
+        <p:spPr/>
+        <p:txBody>
+          <a:bodyPr/>
+          <a:lstStyle/>
+          <a:p>
+            <a:r>
+              <a:rPr lang="en-US" dirty="0"/>
+              <a:t>Code samples</a:t>
+            </a:r>
+            <a:endParaRPr lang="ru-RU" dirty="0"/>
+          </a:p>
+        </p:txBody>
+      </p:sp>
+      <p:sp>
+        <p:nvSpPr>
+          <p:cNvPr id="3" name="Объект 2">
+            <a:extLst>
+              <a:ext uri="{FF2B5EF4-FFF2-40B4-BE49-F238E27FC236}">
+                <a16:creationId xmlns:a16="http://schemas.microsoft.com/office/drawing/2014/main" id="{10484030-C5C9-AE5D-92F1-A645820660BC}"/>
+              </a:ext>
+            </a:extLst>
+          </p:cNvPr>
+          <p:cNvSpPr>
+            <a:spLocks noGrp="1"/>
+          </p:cNvSpPr>
+          <p:nvPr>
+            <p:ph idx="1"/>
+          </p:nvPr>
+        </p:nvSpPr>
+        <p:spPr/>
+        <p:txBody>
+          <a:bodyPr/>
+          <a:lstStyle/>
+          <a:p>
+            <a:endParaRPr lang="ru-RU" dirty="0"/>
+          </a:p>
+        </p:txBody>
+      </p:sp>
+    </p:spTree>
+    <p:extLst>
+      <p:ext uri="{BB962C8B-B14F-4D97-AF65-F5344CB8AC3E}">
+        <p14:creationId xmlns:p14="http://schemas.microsoft.com/office/powerpoint/2010/main" val="2300410717"/>
+      </p:ext>
+    </p:extLst>
+  </p:cSld>
+  <p:clrMapOvr>
+    <a:masterClrMapping/>
+  </p:clrMapOvr>
+</p:sld>
+</file>
+
+<file path=ppt/slides/slide17.xml><?xml version="1.0" encoding="utf-8"?>
+<p:sld xmlns:a="http://schemas.openxmlformats.org/drawingml/2006/main" xmlns:r="http://schemas.openxmlformats.org/officeDocument/2006/relationships" xmlns:p="http://schemas.openxmlformats.org/presentationml/2006/main">
+  <p:cSld>
+    <p:spTree>
+      <p:nvGrpSpPr>
+        <p:cNvPr id="1" name=""/>
+        <p:cNvGrpSpPr/>
+        <p:nvPr/>
+      </p:nvGrpSpPr>
+      <p:grpSpPr>
+        <a:xfrm>
+          <a:off x="0" y="0"/>
+          <a:ext cx="0" cy="0"/>
+          <a:chOff x="0" y="0"/>
+          <a:chExt cx="0" cy="0"/>
+        </a:xfrm>
+      </p:grpSpPr>
+      <p:sp>
+        <p:nvSpPr>
+          <p:cNvPr id="2" name="Заголовок 1">
+            <a:extLst>
+              <a:ext uri="{FF2B5EF4-FFF2-40B4-BE49-F238E27FC236}">
+                <a16:creationId xmlns:a16="http://schemas.microsoft.com/office/drawing/2014/main" id="{3E10851A-69BE-3873-4CB5-6B27539ECCA7}"/>
+              </a:ext>
+            </a:extLst>
+          </p:cNvPr>
+          <p:cNvSpPr>
+            <a:spLocks noGrp="1"/>
+          </p:cNvSpPr>
+          <p:nvPr>
+            <p:ph type="title"/>
+          </p:nvPr>
+        </p:nvSpPr>
+        <p:spPr/>
+        <p:txBody>
+          <a:bodyPr/>
+          <a:lstStyle/>
+          <a:p>
+            <a:r>
+              <a:rPr lang="en-US" dirty="0"/>
+              <a:t>Switch to </a:t>
+            </a:r>
+            <a:r>
+              <a:rPr lang="en-US" dirty="0" err="1"/>
+              <a:t>logisim</a:t>
+            </a:r>
+            <a:endParaRPr lang="ru-RU" dirty="0"/>
+          </a:p>
+        </p:txBody>
+      </p:sp>
+      <p:sp>
+        <p:nvSpPr>
+          <p:cNvPr id="3" name="Объект 2">
+            <a:extLst>
+              <a:ext uri="{FF2B5EF4-FFF2-40B4-BE49-F238E27FC236}">
+                <a16:creationId xmlns:a16="http://schemas.microsoft.com/office/drawing/2014/main" id="{39FB5322-CCEE-F2E2-5921-6A8A23A1DF57}"/>
+              </a:ext>
+            </a:extLst>
+          </p:cNvPr>
+          <p:cNvSpPr>
+            <a:spLocks noGrp="1"/>
+          </p:cNvSpPr>
+          <p:nvPr>
+            <p:ph idx="1"/>
+          </p:nvPr>
+        </p:nvSpPr>
+        <p:spPr/>
+        <p:txBody>
+          <a:bodyPr/>
+          <a:lstStyle/>
+          <a:p>
+            <a:endParaRPr lang="ru-RU"/>
+          </a:p>
+        </p:txBody>
+      </p:sp>
+    </p:spTree>
+    <p:extLst>
+      <p:ext uri="{BB962C8B-B14F-4D97-AF65-F5344CB8AC3E}">
+        <p14:creationId xmlns:p14="http://schemas.microsoft.com/office/powerpoint/2010/main" val="722721471"/>
+      </p:ext>
+    </p:extLst>
+  </p:cSld>
+  <p:clrMapOvr>
+    <a:masterClrMapping/>
+  </p:clrMapOvr>
+</p:sld>
+</file>
+
+<file path=ppt/slides/slide18.xml><?xml version="1.0" encoding="utf-8"?>
+<p:sld xmlns:a="http://schemas.openxmlformats.org/drawingml/2006/main" xmlns:r="http://schemas.openxmlformats.org/officeDocument/2006/relationships" xmlns:p="http://schemas.openxmlformats.org/presentationml/2006/main">
+  <p:cSld>
+    <p:spTree>
+      <p:nvGrpSpPr>
+        <p:cNvPr id="1" name=""/>
+        <p:cNvGrpSpPr/>
+        <p:nvPr/>
+      </p:nvGrpSpPr>
+      <p:grpSpPr>
+        <a:xfrm>
+          <a:off x="0" y="0"/>
+          <a:ext cx="0" cy="0"/>
+          <a:chOff x="0" y="0"/>
+          <a:chExt cx="0" cy="0"/>
+        </a:xfrm>
+      </p:grpSpPr>
+      <p:sp>
+        <p:nvSpPr>
+          <p:cNvPr id="2" name="Заголовок 1">
+            <a:extLst>
+              <a:ext uri="{FF2B5EF4-FFF2-40B4-BE49-F238E27FC236}">
                 <a16:creationId xmlns:a16="http://schemas.microsoft.com/office/drawing/2014/main" id="{5656E548-92E9-31CA-0260-A789155CE7F3}"/>
               </a:ext>
             </a:extLst>
@@ -3836,7 +4258,11 @@
           <a:bodyPr/>
           <a:lstStyle/>
           <a:p>
-            <a:endParaRPr lang="ru-RU"/>
+            <a:r>
+              <a:rPr lang="en-US" dirty="0"/>
+              <a:t>Great project</a:t>
+            </a:r>
+            <a:endParaRPr lang="ru-RU" dirty="0"/>
           </a:p>
         </p:txBody>
       </p:sp>
@@ -3875,7 +4301,7 @@
           <p:cNvPr id="2" name="Заголовок 1">
             <a:extLst>
               <a:ext uri="{FF2B5EF4-FFF2-40B4-BE49-F238E27FC236}">
-                <a16:creationId xmlns:a16="http://schemas.microsoft.com/office/drawing/2014/main" id="{771BECBF-13CA-6F36-DBD6-F89570900409}"/>
+                <a16:creationId xmlns:a16="http://schemas.microsoft.com/office/drawing/2014/main" id="{2D85BF7B-381B-046F-97C1-C16E2DD64CD2}"/>
               </a:ext>
             </a:extLst>
           </p:cNvPr>
@@ -3893,7 +4319,7 @@
           <a:p>
             <a:r>
               <a:rPr lang="en-US" dirty="0"/>
-              <a:t>Universal</a:t>
+              <a:t>Idea</a:t>
             </a:r>
             <a:endParaRPr lang="ru-RU" dirty="0"/>
           </a:p>
@@ -3904,7 +4330,7 @@
           <p:cNvPr id="3" name="Объект 2">
             <a:extLst>
               <a:ext uri="{FF2B5EF4-FFF2-40B4-BE49-F238E27FC236}">
-                <a16:creationId xmlns:a16="http://schemas.microsoft.com/office/drawing/2014/main" id="{C19E87E4-FE4F-111E-3E05-0E6DEFD60D2C}"/>
+                <a16:creationId xmlns:a16="http://schemas.microsoft.com/office/drawing/2014/main" id="{FF3227BF-13AD-69AB-1B87-ACBA5E823FAC}"/>
               </a:ext>
             </a:extLst>
           </p:cNvPr>
@@ -3922,7 +4348,7 @@
           <a:p>
             <a:r>
               <a:rPr lang="en-US" dirty="0"/>
-              <a:t>Can be configured to solve different tasks</a:t>
+              <a:t>In our project we deiced not to design proprietary devices, but to develop a universal platform, that have a lot of applications and can be configured to solve different tasks.</a:t>
             </a:r>
             <a:endParaRPr lang="ru-RU" dirty="0"/>
           </a:p>
@@ -3931,7 +4357,7 @@
     </p:spTree>
     <p:extLst>
       <p:ext uri="{BB962C8B-B14F-4D97-AF65-F5344CB8AC3E}">
-        <p14:creationId xmlns:p14="http://schemas.microsoft.com/office/powerpoint/2010/main" val="2638204264"/>
+        <p14:creationId xmlns:p14="http://schemas.microsoft.com/office/powerpoint/2010/main" val="1283316590"/>
       </p:ext>
     </p:extLst>
   </p:cSld>
@@ -4010,23 +4436,54 @@
           <a:p>
             <a:r>
               <a:rPr lang="en-US" dirty="0"/>
-              <a:t>Main scheme consists of modules connected only with wires with no additional </a:t>
-            </a:r>
-            <a:r>
-              <a:rPr lang="en-US" dirty="0" err="1"/>
-              <a:t>elemnts</a:t>
-            </a:r>
-            <a:endParaRPr lang="en-US" dirty="0"/>
+              <a:t>Main scheme consists of modules (devices) connected only with wires with no additional elements</a:t>
+            </a:r>
           </a:p>
           <a:p>
             <a:r>
               <a:rPr lang="en-US" dirty="0"/>
-              <a:t>Just like devices on system bus on regular pc</a:t>
+              <a:t>Just like devices on system bus of regular PC</a:t>
             </a:r>
             <a:endParaRPr lang="ru-RU" dirty="0"/>
           </a:p>
         </p:txBody>
       </p:sp>
+      <p:pic>
+        <p:nvPicPr>
+          <p:cNvPr id="5" name="Рисунок 4">
+            <a:extLst>
+              <a:ext uri="{FF2B5EF4-FFF2-40B4-BE49-F238E27FC236}">
+                <a16:creationId xmlns:a16="http://schemas.microsoft.com/office/drawing/2014/main" id="{06761420-899B-A268-51EA-B9D2B0A4AE15}"/>
+              </a:ext>
+            </a:extLst>
+          </p:cNvPr>
+          <p:cNvPicPr>
+            <a:picLocks noChangeAspect="1"/>
+          </p:cNvPicPr>
+          <p:nvPr/>
+        </p:nvPicPr>
+        <p:blipFill>
+          <a:blip r:embed="rId2">
+            <a:extLst>
+              <a:ext uri="{28A0092B-C50C-407E-A947-70E740481C1C}">
+                <a14:useLocalDpi xmlns:a14="http://schemas.microsoft.com/office/drawing/2010/main" val="0"/>
+              </a:ext>
+            </a:extLst>
+          </a:blip>
+          <a:stretch>
+            <a:fillRect/>
+          </a:stretch>
+        </p:blipFill>
+        <p:spPr>
+          <a:xfrm>
+            <a:off x="99175" y="3844581"/>
+            <a:ext cx="11993649" cy="2467319"/>
+          </a:xfrm>
+          <a:prstGeom prst="rect">
+            <a:avLst/>
+          </a:prstGeom>
+        </p:spPr>
+      </p:pic>
     </p:spTree>
     <p:extLst>
       <p:ext uri="{BB962C8B-B14F-4D97-AF65-F5344CB8AC3E}">
@@ -4062,7 +4519,7 @@
           <p:cNvPr id="2" name="Заголовок 1">
             <a:extLst>
               <a:ext uri="{FF2B5EF4-FFF2-40B4-BE49-F238E27FC236}">
-                <a16:creationId xmlns:a16="http://schemas.microsoft.com/office/drawing/2014/main" id="{9FCA4405-FCA6-EF8E-60AC-C0467F76684E}"/>
+                <a16:creationId xmlns:a16="http://schemas.microsoft.com/office/drawing/2014/main" id="{08FE5456-ECF3-6020-B2F4-987BBFBCACF2}"/>
               </a:ext>
             </a:extLst>
           </p:cNvPr>
@@ -4080,7 +4537,7 @@
           <a:p>
             <a:r>
               <a:rPr lang="en-US" dirty="0"/>
-              <a:t>Platform ?</a:t>
+              <a:t>Features of this platform</a:t>
             </a:r>
             <a:endParaRPr lang="ru-RU" dirty="0"/>
           </a:p>
@@ -4091,7 +4548,7 @@
           <p:cNvPr id="3" name="Объект 2">
             <a:extLst>
               <a:ext uri="{FF2B5EF4-FFF2-40B4-BE49-F238E27FC236}">
-                <a16:creationId xmlns:a16="http://schemas.microsoft.com/office/drawing/2014/main" id="{854741BA-EB16-D32D-8035-0170E6601679}"/>
+                <a16:creationId xmlns:a16="http://schemas.microsoft.com/office/drawing/2014/main" id="{49642DB3-6D03-D4BE-047A-42D27FE9A7C2}"/>
               </a:ext>
             </a:extLst>
           </p:cNvPr>
@@ -4107,14 +4564,79 @@
           <a:bodyPr/>
           <a:lstStyle/>
           <a:p>
-            <a:endParaRPr lang="ru-RU" dirty="0"/>
+            <a:r>
+              <a:rPr lang="en-US" dirty="0"/>
+              <a:t>Display controller</a:t>
+            </a:r>
+          </a:p>
+          <a:p>
+            <a:r>
+              <a:rPr lang="en-US" dirty="0"/>
+              <a:t>Expandable ROM and RAM</a:t>
+            </a:r>
+            <a:r>
+              <a:rPr lang="ru-RU" dirty="0"/>
+              <a:t> </a:t>
+            </a:r>
+            <a:r>
+              <a:rPr lang="en-US" dirty="0"/>
+              <a:t>both up 32 KB</a:t>
+            </a:r>
+          </a:p>
+          <a:p>
+            <a:r>
+              <a:rPr lang="en-US" dirty="0"/>
+              <a:t>A lot of other useful peripheral devices</a:t>
+            </a:r>
+          </a:p>
+          <a:p>
+            <a:pPr lvl="1"/>
+            <a:r>
+              <a:rPr lang="en-US" dirty="0"/>
+              <a:t>Joystick, Terminal, Keypad Controllers</a:t>
+            </a:r>
+          </a:p>
+          <a:p>
+            <a:pPr lvl="1"/>
+            <a:r>
+              <a:rPr lang="en-US" dirty="0"/>
+              <a:t>Interrupt Arbiter</a:t>
+            </a:r>
+          </a:p>
+          <a:p>
+            <a:pPr lvl="1"/>
+            <a:r>
+              <a:rPr lang="en-US" dirty="0"/>
+              <a:t>Random number generator</a:t>
+            </a:r>
+          </a:p>
+          <a:p>
+            <a:pPr lvl="1"/>
+            <a:r>
+              <a:rPr lang="en-US" dirty="0"/>
+              <a:t>Hex and 7-segment display drivers</a:t>
+            </a:r>
+          </a:p>
+          <a:p>
+            <a:pPr lvl="1"/>
+            <a:r>
+              <a:rPr lang="en-US" dirty="0"/>
+              <a:t>16-bit Math Coprocessor</a:t>
+            </a:r>
+          </a:p>
+          <a:p>
+            <a:pPr lvl="1"/>
+            <a:endParaRPr lang="en-US" dirty="0"/>
+          </a:p>
+          <a:p>
+            <a:endParaRPr lang="en-US" dirty="0"/>
           </a:p>
         </p:txBody>
       </p:sp>
     </p:spTree>
     <p:extLst>
       <p:ext uri="{BB962C8B-B14F-4D97-AF65-F5344CB8AC3E}">
-        <p14:creationId xmlns:p14="http://schemas.microsoft.com/office/powerpoint/2010/main" val="2526613271"/>
+        <p14:creationId xmlns:p14="http://schemas.microsoft.com/office/powerpoint/2010/main" val="3164682877"/>
       </p:ext>
     </p:extLst>
   </p:cSld>
@@ -4146,7 +4668,7 @@
           <p:cNvPr id="2" name="Заголовок 1">
             <a:extLst>
               <a:ext uri="{FF2B5EF4-FFF2-40B4-BE49-F238E27FC236}">
-                <a16:creationId xmlns:a16="http://schemas.microsoft.com/office/drawing/2014/main" id="{8026CC67-26A5-F49D-A59D-211FC94E1DD3}"/>
+                <a16:creationId xmlns:a16="http://schemas.microsoft.com/office/drawing/2014/main" id="{0106AD5A-C34C-141B-A28A-12769F77646E}"/>
               </a:ext>
             </a:extLst>
           </p:cNvPr>
@@ -4164,7 +4686,7 @@
           <a:p>
             <a:r>
               <a:rPr lang="en-US" dirty="0"/>
-              <a:t>Our approach to memory banks</a:t>
+              <a:t>Display</a:t>
             </a:r>
             <a:endParaRPr lang="ru-RU" dirty="0"/>
           </a:p>
@@ -4175,7 +4697,7 @@
           <p:cNvPr id="3" name="Объект 2">
             <a:extLst>
               <a:ext uri="{FF2B5EF4-FFF2-40B4-BE49-F238E27FC236}">
-                <a16:creationId xmlns:a16="http://schemas.microsoft.com/office/drawing/2014/main" id="{85DBA9EB-2D89-D40A-906B-BB024ECFDFE8}"/>
+                <a16:creationId xmlns:a16="http://schemas.microsoft.com/office/drawing/2014/main" id="{74CADA7F-4113-E1EE-499D-6663BEA0ABB2}"/>
               </a:ext>
             </a:extLst>
           </p:cNvPr>
@@ -4191,14 +4713,71 @@
           <a:bodyPr/>
           <a:lstStyle/>
           <a:p>
-            <a:endParaRPr lang="ru-RU" dirty="0"/>
-          </a:p>
-        </p:txBody>
-      </p:sp>
+            <a:r>
+              <a:rPr lang="en-US" dirty="0"/>
+              <a:t>32x32/30x32 pixels</a:t>
+            </a:r>
+          </a:p>
+          <a:p>
+            <a:r>
+              <a:rPr lang="en-US" dirty="0"/>
+              <a:t>1/8 colors</a:t>
+            </a:r>
+          </a:p>
+          <a:p>
+            <a:r>
+              <a:rPr lang="en-US" dirty="0"/>
+              <a:t>Double buffer ???</a:t>
+            </a:r>
+          </a:p>
+          <a:p>
+            <a:pPr marL="0" indent="0">
+              <a:buNone/>
+            </a:pPr>
+            <a:endParaRPr lang="en-US" dirty="0"/>
+          </a:p>
+        </p:txBody>
+      </p:sp>
+      <p:pic>
+        <p:nvPicPr>
+          <p:cNvPr id="5" name="Рисунок 4">
+            <a:extLst>
+              <a:ext uri="{FF2B5EF4-FFF2-40B4-BE49-F238E27FC236}">
+                <a16:creationId xmlns:a16="http://schemas.microsoft.com/office/drawing/2014/main" id="{71B7CFF7-6438-E2F4-7AB3-0F4F4AD21214}"/>
+              </a:ext>
+            </a:extLst>
+          </p:cNvPr>
+          <p:cNvPicPr>
+            <a:picLocks noChangeAspect="1"/>
+          </p:cNvPicPr>
+          <p:nvPr/>
+        </p:nvPicPr>
+        <p:blipFill>
+          <a:blip r:embed="rId2">
+            <a:extLst>
+              <a:ext uri="{28A0092B-C50C-407E-A947-70E740481C1C}">
+                <a14:useLocalDpi xmlns:a14="http://schemas.microsoft.com/office/drawing/2010/main" val="0"/>
+              </a:ext>
+            </a:extLst>
+          </a:blip>
+          <a:stretch>
+            <a:fillRect/>
+          </a:stretch>
+        </p:blipFill>
+        <p:spPr>
+          <a:xfrm>
+            <a:off x="5410459" y="1114992"/>
+            <a:ext cx="6030167" cy="4429743"/>
+          </a:xfrm>
+          <a:prstGeom prst="rect">
+            <a:avLst/>
+          </a:prstGeom>
+        </p:spPr>
+      </p:pic>
     </p:spTree>
     <p:extLst>
       <p:ext uri="{BB962C8B-B14F-4D97-AF65-F5344CB8AC3E}">
-        <p14:creationId xmlns:p14="http://schemas.microsoft.com/office/powerpoint/2010/main" val="697551656"/>
+        <p14:creationId xmlns:p14="http://schemas.microsoft.com/office/powerpoint/2010/main" val="2202224521"/>
       </p:ext>
     </p:extLst>
   </p:cSld>
@@ -4230,7 +4809,7 @@
           <p:cNvPr id="2" name="Заголовок 1">
             <a:extLst>
               <a:ext uri="{FF2B5EF4-FFF2-40B4-BE49-F238E27FC236}">
-                <a16:creationId xmlns:a16="http://schemas.microsoft.com/office/drawing/2014/main" id="{01D133F8-DE7A-76C8-B9BF-85EBF5505C35}"/>
+                <a16:creationId xmlns:a16="http://schemas.microsoft.com/office/drawing/2014/main" id="{8026CC67-26A5-F49D-A59D-211FC94E1DD3}"/>
               </a:ext>
             </a:extLst>
           </p:cNvPr>
@@ -4246,7 +4825,11 @@
           <a:bodyPr/>
           <a:lstStyle/>
           <a:p>
-            <a:endParaRPr lang="ru-RU"/>
+            <a:r>
+              <a:rPr lang="en-US" dirty="0"/>
+              <a:t>Our approach to memory banks</a:t>
+            </a:r>
+            <a:endParaRPr lang="ru-RU" dirty="0"/>
           </a:p>
         </p:txBody>
       </p:sp>
@@ -4255,7 +4838,7 @@
           <p:cNvPr id="3" name="Объект 2">
             <a:extLst>
               <a:ext uri="{FF2B5EF4-FFF2-40B4-BE49-F238E27FC236}">
-                <a16:creationId xmlns:a16="http://schemas.microsoft.com/office/drawing/2014/main" id="{D7FF9C22-0173-91B1-205A-A1580B595F47}"/>
+                <a16:creationId xmlns:a16="http://schemas.microsoft.com/office/drawing/2014/main" id="{85DBA9EB-2D89-D40A-906B-BB024ECFDFE8}"/>
               </a:ext>
             </a:extLst>
           </p:cNvPr>
@@ -4266,27 +4849,84 @@
             <p:ph idx="1"/>
           </p:nvPr>
         </p:nvSpPr>
-        <p:spPr/>
-        <p:txBody>
-          <a:bodyPr/>
+        <p:spPr>
+          <a:xfrm>
+            <a:off x="838200" y="1825625"/>
+            <a:ext cx="3363686" cy="4351338"/>
+          </a:xfrm>
+        </p:spPr>
+        <p:txBody>
+          <a:bodyPr>
+            <a:normAutofit fontScale="92500" lnSpcReduction="20000"/>
+          </a:bodyPr>
           <a:lstStyle/>
           <a:p>
             <a:r>
               <a:rPr lang="en-US" dirty="0"/>
-              <a:t>We need to produce big images -&gt; </a:t>
-            </a:r>
-            <a:r>
-              <a:rPr lang="en-US" dirty="0" err="1"/>
-              <a:t>cocomake</a:t>
+              <a:t>Banks are independent 256 bytes sections of ROM</a:t>
+            </a:r>
+          </a:p>
+          <a:p>
+            <a:r>
+              <a:rPr lang="en-US" dirty="0"/>
+              <a:t>We can jump from random place of one bank to random place of other bank</a:t>
+            </a:r>
+          </a:p>
+          <a:p>
+            <a:r>
+              <a:rPr lang="en-US" dirty="0"/>
+              <a:t>We can return from bank to the place where we had been before</a:t>
+            </a:r>
+          </a:p>
+          <a:p>
+            <a:r>
+              <a:rPr lang="en-US" dirty="0"/>
+              <a:t>Recursive calls</a:t>
             </a:r>
             <a:endParaRPr lang="ru-RU" dirty="0"/>
           </a:p>
         </p:txBody>
       </p:sp>
+      <p:pic>
+        <p:nvPicPr>
+          <p:cNvPr id="5" name="Рисунок 4">
+            <a:extLst>
+              <a:ext uri="{FF2B5EF4-FFF2-40B4-BE49-F238E27FC236}">
+                <a16:creationId xmlns:a16="http://schemas.microsoft.com/office/drawing/2014/main" id="{702AFEC7-1341-637E-2380-39112B81DF04}"/>
+              </a:ext>
+            </a:extLst>
+          </p:cNvPr>
+          <p:cNvPicPr>
+            <a:picLocks noChangeAspect="1"/>
+          </p:cNvPicPr>
+          <p:nvPr/>
+        </p:nvPicPr>
+        <p:blipFill>
+          <a:blip r:embed="rId2">
+            <a:extLst>
+              <a:ext uri="{28A0092B-C50C-407E-A947-70E740481C1C}">
+                <a14:useLocalDpi xmlns:a14="http://schemas.microsoft.com/office/drawing/2010/main" val="0"/>
+              </a:ext>
+            </a:extLst>
+          </a:blip>
+          <a:stretch>
+            <a:fillRect/>
+          </a:stretch>
+        </p:blipFill>
+        <p:spPr>
+          <a:xfrm>
+            <a:off x="6606948" y="0"/>
+            <a:ext cx="5248275" cy="6581775"/>
+          </a:xfrm>
+          <a:prstGeom prst="rect">
+            <a:avLst/>
+          </a:prstGeom>
+        </p:spPr>
+      </p:pic>
     </p:spTree>
     <p:extLst>
       <p:ext uri="{BB962C8B-B14F-4D97-AF65-F5344CB8AC3E}">
-        <p14:creationId xmlns:p14="http://schemas.microsoft.com/office/powerpoint/2010/main" val="29750948"/>
+        <p14:creationId xmlns:p14="http://schemas.microsoft.com/office/powerpoint/2010/main" val="697551656"/>
       </p:ext>
     </p:extLst>
   </p:cSld>
@@ -4318,7 +4958,7 @@
           <p:cNvPr id="2" name="Заголовок 1">
             <a:extLst>
               <a:ext uri="{FF2B5EF4-FFF2-40B4-BE49-F238E27FC236}">
-                <a16:creationId xmlns:a16="http://schemas.microsoft.com/office/drawing/2014/main" id="{3D9B5570-5D2E-CDD5-99C2-48E18F8ACFF6}"/>
+                <a16:creationId xmlns:a16="http://schemas.microsoft.com/office/drawing/2014/main" id="{01D133F8-DE7A-76C8-B9BF-85EBF5505C35}"/>
               </a:ext>
             </a:extLst>
           </p:cNvPr>
@@ -4334,43 +4974,82 @@
           <a:bodyPr/>
           <a:lstStyle/>
           <a:p>
+            <a:endParaRPr lang="ru-RU" dirty="0"/>
+          </a:p>
+        </p:txBody>
+      </p:sp>
+      <p:sp>
+        <p:nvSpPr>
+          <p:cNvPr id="3" name="Объект 2">
+            <a:extLst>
+              <a:ext uri="{FF2B5EF4-FFF2-40B4-BE49-F238E27FC236}">
+                <a16:creationId xmlns:a16="http://schemas.microsoft.com/office/drawing/2014/main" id="{D7FF9C22-0173-91B1-205A-A1580B595F47}"/>
+              </a:ext>
+            </a:extLst>
+          </p:cNvPr>
+          <p:cNvSpPr>
+            <a:spLocks noGrp="1"/>
+          </p:cNvSpPr>
+          <p:nvPr>
+            <p:ph idx="1"/>
+          </p:nvPr>
+        </p:nvSpPr>
+        <p:spPr/>
+        <p:txBody>
+          <a:bodyPr/>
+          <a:lstStyle/>
+          <a:p>
+            <a:r>
+              <a:rPr lang="en-US" dirty="0"/>
+              <a:t>We need to produce big images -&gt; </a:t>
+            </a:r>
             <a:r>
               <a:rPr lang="en-US" dirty="0" err="1"/>
               <a:t>cocomake</a:t>
             </a:r>
+            <a:endParaRPr lang="en-US" dirty="0"/>
+          </a:p>
+          <a:p>
+            <a:r>
+              <a:rPr lang="en-US" dirty="0"/>
+              <a:t>ROM image consists of continuous</a:t>
+            </a:r>
+            <a:r>
+              <a:rPr lang="ru-RU" dirty="0"/>
+              <a:t> 256 </a:t>
+            </a:r>
+            <a:r>
+              <a:rPr lang="en-US" dirty="0"/>
+              <a:t>byte modules</a:t>
+            </a:r>
+          </a:p>
+          <a:p>
+            <a:r>
+              <a:rPr lang="en-US" dirty="0" err="1"/>
+              <a:t>Cocol</a:t>
+            </a:r>
+            <a:r>
+              <a:rPr lang="en-US" dirty="0"/>
+              <a:t> (standard linker) can’t generate images larger than 256 bytes.</a:t>
+            </a:r>
+          </a:p>
+          <a:p>
+            <a:r>
+              <a:rPr lang="en-US" dirty="0"/>
+              <a:t>That’s why we developed </a:t>
+            </a:r>
+            <a:r>
+              <a:rPr lang="en-US" dirty="0" err="1"/>
+              <a:t>cocomake</a:t>
+            </a:r>
             <a:endParaRPr lang="ru-RU" dirty="0"/>
-          </a:p>
-        </p:txBody>
-      </p:sp>
-      <p:sp>
-        <p:nvSpPr>
-          <p:cNvPr id="3" name="Объект 2">
-            <a:extLst>
-              <a:ext uri="{FF2B5EF4-FFF2-40B4-BE49-F238E27FC236}">
-                <a16:creationId xmlns:a16="http://schemas.microsoft.com/office/drawing/2014/main" id="{A8B7F97E-F273-6E9D-8D34-E2F072BED5B4}"/>
-              </a:ext>
-            </a:extLst>
-          </p:cNvPr>
-          <p:cNvSpPr>
-            <a:spLocks noGrp="1"/>
-          </p:cNvSpPr>
-          <p:nvPr>
-            <p:ph idx="1"/>
-          </p:nvPr>
-        </p:nvSpPr>
-        <p:spPr/>
-        <p:txBody>
-          <a:bodyPr/>
-          <a:lstStyle/>
-          <a:p>
-            <a:endParaRPr lang="ru-RU"/>
           </a:p>
         </p:txBody>
       </p:sp>
     </p:spTree>
     <p:extLst>
       <p:ext uri="{BB962C8B-B14F-4D97-AF65-F5344CB8AC3E}">
-        <p14:creationId xmlns:p14="http://schemas.microsoft.com/office/powerpoint/2010/main" val="526346459"/>
+        <p14:creationId xmlns:p14="http://schemas.microsoft.com/office/powerpoint/2010/main" val="29750948"/>
       </p:ext>
     </p:extLst>
   </p:cSld>
@@ -4402,7 +5081,7 @@
           <p:cNvPr id="2" name="Заголовок 1">
             <a:extLst>
               <a:ext uri="{FF2B5EF4-FFF2-40B4-BE49-F238E27FC236}">
-                <a16:creationId xmlns:a16="http://schemas.microsoft.com/office/drawing/2014/main" id="{553F2F79-37D5-5E80-57BA-2B68936B086F}"/>
+                <a16:creationId xmlns:a16="http://schemas.microsoft.com/office/drawing/2014/main" id="{3D9B5570-5D2E-CDD5-99C2-48E18F8ACFF6}"/>
               </a:ext>
             </a:extLst>
           </p:cNvPr>
@@ -4420,7 +5099,7 @@
           <a:p>
             <a:r>
               <a:rPr lang="en-US" dirty="0" err="1"/>
-              <a:t>Demostation</a:t>
+              <a:t>cocomake</a:t>
             </a:r>
             <a:endParaRPr lang="ru-RU" dirty="0"/>
           </a:p>
@@ -4431,7 +5110,7 @@
           <p:cNvPr id="3" name="Объект 2">
             <a:extLst>
               <a:ext uri="{FF2B5EF4-FFF2-40B4-BE49-F238E27FC236}">
-                <a16:creationId xmlns:a16="http://schemas.microsoft.com/office/drawing/2014/main" id="{C1E7D821-0E45-A305-B21C-538FC6BA38D9}"/>
+                <a16:creationId xmlns:a16="http://schemas.microsoft.com/office/drawing/2014/main" id="{A8B7F97E-F273-6E9D-8D34-E2F072BED5B4}"/>
               </a:ext>
             </a:extLst>
           </p:cNvPr>
@@ -4447,14 +5126,62 @@
           <a:bodyPr/>
           <a:lstStyle/>
           <a:p>
-            <a:endParaRPr lang="ru-RU"/>
-          </a:p>
-        </p:txBody>
-      </p:sp>
+            <a:r>
+              <a:rPr lang="en-US" dirty="0"/>
+              <a:t>Configurable build system that can produce imager larger that 256 bytes</a:t>
+            </a:r>
+          </a:p>
+          <a:p>
+            <a:r>
+              <a:rPr lang="en-US" dirty="0"/>
+              <a:t>Incremental</a:t>
+            </a:r>
+          </a:p>
+          <a:p>
+            <a:endParaRPr lang="ru-RU" dirty="0"/>
+          </a:p>
+        </p:txBody>
+      </p:sp>
+      <p:pic>
+        <p:nvPicPr>
+          <p:cNvPr id="5" name="Рисунок 4">
+            <a:extLst>
+              <a:ext uri="{FF2B5EF4-FFF2-40B4-BE49-F238E27FC236}">
+                <a16:creationId xmlns:a16="http://schemas.microsoft.com/office/drawing/2014/main" id="{85401FBA-7D16-F69A-5B33-C567AD001E5A}"/>
+              </a:ext>
+            </a:extLst>
+          </p:cNvPr>
+          <p:cNvPicPr>
+            <a:picLocks noChangeAspect="1"/>
+          </p:cNvPicPr>
+          <p:nvPr/>
+        </p:nvPicPr>
+        <p:blipFill>
+          <a:blip r:embed="rId2">
+            <a:extLst>
+              <a:ext uri="{28A0092B-C50C-407E-A947-70E740481C1C}">
+                <a14:useLocalDpi xmlns:a14="http://schemas.microsoft.com/office/drawing/2010/main" val="0"/>
+              </a:ext>
+            </a:extLst>
+          </a:blip>
+          <a:stretch>
+            <a:fillRect/>
+          </a:stretch>
+        </p:blipFill>
+        <p:spPr>
+          <a:xfrm>
+            <a:off x="4533900" y="2276475"/>
+            <a:ext cx="6819900" cy="4581525"/>
+          </a:xfrm>
+          <a:prstGeom prst="rect">
+            <a:avLst/>
+          </a:prstGeom>
+        </p:spPr>
+      </p:pic>
     </p:spTree>
     <p:extLst>
       <p:ext uri="{BB962C8B-B14F-4D97-AF65-F5344CB8AC3E}">
-        <p14:creationId xmlns:p14="http://schemas.microsoft.com/office/powerpoint/2010/main" val="3201190602"/>
+        <p14:creationId xmlns:p14="http://schemas.microsoft.com/office/powerpoint/2010/main" val="526346459"/>
       </p:ext>
     </p:extLst>
   </p:cSld>
@@ -4486,7 +5213,7 @@
           <p:cNvPr id="2" name="Заголовок 1">
             <a:extLst>
               <a:ext uri="{FF2B5EF4-FFF2-40B4-BE49-F238E27FC236}">
-                <a16:creationId xmlns:a16="http://schemas.microsoft.com/office/drawing/2014/main" id="{814D474C-90BE-0440-D452-4921A1FF90A2}"/>
+                <a16:creationId xmlns:a16="http://schemas.microsoft.com/office/drawing/2014/main" id="{553F2F79-37D5-5E80-57BA-2B68936B086F}"/>
               </a:ext>
             </a:extLst>
           </p:cNvPr>
@@ -4503,8 +5230,8 @@
           <a:lstStyle/>
           <a:p>
             <a:r>
-              <a:rPr lang="en-US" dirty="0"/>
-              <a:t>Scheme</a:t>
+              <a:rPr lang="en-US" dirty="0" err="1"/>
+              <a:t>Demostation</a:t>
             </a:r>
             <a:endParaRPr lang="ru-RU" dirty="0"/>
           </a:p>
@@ -4515,7 +5242,7 @@
           <p:cNvPr id="3" name="Объект 2">
             <a:extLst>
               <a:ext uri="{FF2B5EF4-FFF2-40B4-BE49-F238E27FC236}">
-                <a16:creationId xmlns:a16="http://schemas.microsoft.com/office/drawing/2014/main" id="{1163119A-80FE-1237-79E7-C73C748E180B}"/>
+                <a16:creationId xmlns:a16="http://schemas.microsoft.com/office/drawing/2014/main" id="{C1E7D821-0E45-A305-B21C-538FC6BA38D9}"/>
               </a:ext>
             </a:extLst>
           </p:cNvPr>
@@ -4538,7 +5265,7 @@
     </p:spTree>
     <p:extLst>
       <p:ext uri="{BB962C8B-B14F-4D97-AF65-F5344CB8AC3E}">
-        <p14:creationId xmlns:p14="http://schemas.microsoft.com/office/powerpoint/2010/main" val="2234971504"/>
+        <p14:creationId xmlns:p14="http://schemas.microsoft.com/office/powerpoint/2010/main" val="3201190602"/>
       </p:ext>
     </p:extLst>
   </p:cSld>

</xml_diff>